<commit_message>
[승배] 2020 07 14 ERD 수정 및 Mainactivity xmlPullParser수정 및 Company.class 생성
</commit_message>
<xml_diff>
--- a/3. Database설계서 (ERD)/ERD 설계서.pptx
+++ b/3. Database설계서 (ERD)/ERD 설계서.pptx
@@ -3428,6 +3428,42 @@
           </a:prstGeom>
         </p:spPr>
       </p:pic>
+      <p:pic>
+        <p:nvPicPr>
+          <p:cNvPr id="3" name="그림 2" descr="스크린샷이(가) 표시된 사진&#10;&#10;자동 생성된 설명">
+            <a:extLst>
+              <a:ext uri="{FF2B5EF4-FFF2-40B4-BE49-F238E27FC236}">
+                <a16:creationId xmlns:a16="http://schemas.microsoft.com/office/drawing/2014/main" id="{22A46390-886F-4407-A1F9-DE9B486697AD}"/>
+              </a:ext>
+            </a:extLst>
+          </p:cNvPr>
+          <p:cNvPicPr>
+            <a:picLocks noChangeAspect="1"/>
+          </p:cNvPicPr>
+          <p:nvPr/>
+        </p:nvPicPr>
+        <p:blipFill>
+          <a:blip r:embed="rId5">
+            <a:extLst>
+              <a:ext uri="{28A0092B-C50C-407E-A947-70E740481C1C}">
+                <a14:useLocalDpi xmlns:a14="http://schemas.microsoft.com/office/drawing/2010/main" val="0"/>
+              </a:ext>
+            </a:extLst>
+          </a:blip>
+          <a:stretch>
+            <a:fillRect/>
+          </a:stretch>
+        </p:blipFill>
+        <p:spPr>
+          <a:xfrm>
+            <a:off x="1158437" y="1487898"/>
+            <a:ext cx="5088513" cy="4526535"/>
+          </a:xfrm>
+          <a:prstGeom prst="rect">
+            <a:avLst/>
+          </a:prstGeom>
+        </p:spPr>
+      </p:pic>
     </p:spTree>
     <p:extLst>
       <p:ext uri="{BB962C8B-B14F-4D97-AF65-F5344CB8AC3E}">
@@ -4667,42 +4703,6 @@
           </a:graphicData>
         </a:graphic>
       </p:graphicFrame>
-      <p:pic>
-        <p:nvPicPr>
-          <p:cNvPr id="6" name="그림 5" descr="스크린샷이(가) 표시된 사진&#10;&#10;자동 생성된 설명">
-            <a:extLst>
-              <a:ext uri="{FF2B5EF4-FFF2-40B4-BE49-F238E27FC236}">
-                <a16:creationId xmlns:a16="http://schemas.microsoft.com/office/drawing/2014/main" id="{AE9CDA33-B080-44AF-860D-EB9EE4C7D676}"/>
-              </a:ext>
-            </a:extLst>
-          </p:cNvPr>
-          <p:cNvPicPr>
-            <a:picLocks noChangeAspect="1"/>
-          </p:cNvPicPr>
-          <p:nvPr/>
-        </p:nvPicPr>
-        <p:blipFill>
-          <a:blip r:embed="rId3">
-            <a:extLst>
-              <a:ext uri="{28A0092B-C50C-407E-A947-70E740481C1C}">
-                <a14:useLocalDpi xmlns:a14="http://schemas.microsoft.com/office/drawing/2010/main" val="0"/>
-              </a:ext>
-            </a:extLst>
-          </a:blip>
-          <a:stretch>
-            <a:fillRect/>
-          </a:stretch>
-        </p:blipFill>
-        <p:spPr>
-          <a:xfrm>
-            <a:off x="982045" y="1568619"/>
-            <a:ext cx="4436381" cy="4628905"/>
-          </a:xfrm>
-          <a:prstGeom prst="rect">
-            <a:avLst/>
-          </a:prstGeom>
-        </p:spPr>
-      </p:pic>
       <p:sp>
         <p:nvSpPr>
           <p:cNvPr id="26" name="TextBox 25">
@@ -4837,6 +4837,42 @@
           </a:fontRef>
         </p:style>
       </p:cxnSp>
+      <p:pic>
+        <p:nvPicPr>
+          <p:cNvPr id="13" name="그림 12" descr="스크린샷이(가) 표시된 사진&#10;&#10;자동 생성된 설명">
+            <a:extLst>
+              <a:ext uri="{FF2B5EF4-FFF2-40B4-BE49-F238E27FC236}">
+                <a16:creationId xmlns:a16="http://schemas.microsoft.com/office/drawing/2014/main" id="{E885B855-1393-417A-A3C5-5B208F1959B5}"/>
+              </a:ext>
+            </a:extLst>
+          </p:cNvPr>
+          <p:cNvPicPr>
+            <a:picLocks noChangeAspect="1"/>
+          </p:cNvPicPr>
+          <p:nvPr/>
+        </p:nvPicPr>
+        <p:blipFill>
+          <a:blip r:embed="rId3">
+            <a:extLst>
+              <a:ext uri="{28A0092B-C50C-407E-A947-70E740481C1C}">
+                <a14:useLocalDpi xmlns:a14="http://schemas.microsoft.com/office/drawing/2010/main" val="0"/>
+              </a:ext>
+            </a:extLst>
+          </a:blip>
+          <a:stretch>
+            <a:fillRect/>
+          </a:stretch>
+        </p:blipFill>
+        <p:spPr>
+          <a:xfrm>
+            <a:off x="985901" y="1585463"/>
+            <a:ext cx="4432525" cy="4612061"/>
+          </a:xfrm>
+          <a:prstGeom prst="rect">
+            <a:avLst/>
+          </a:prstGeom>
+        </p:spPr>
+      </p:pic>
     </p:spTree>
     <p:extLst>
       <p:ext uri="{BB962C8B-B14F-4D97-AF65-F5344CB8AC3E}">

</xml_diff>